<commit_message>
completed prez, first draft
</commit_message>
<xml_diff>
--- a/tdsf-midterm-prez.pptx
+++ b/tdsf-midterm-prez.pptx
@@ -14,6 +14,9 @@
     <p:sldId id="265" r:id="rId8"/>
     <p:sldId id="261" r:id="rId9"/>
     <p:sldId id="262" r:id="rId10"/>
+    <p:sldId id="266" r:id="rId11"/>
+    <p:sldId id="267" r:id="rId12"/>
+    <p:sldId id="268" r:id="rId13"/>
   </p:sldIdLst>
   <p:sldSz cx="12192000" cy="6858000"/>
   <p:notesSz cx="6858000" cy="9144000"/>
@@ -4581,6 +4584,423 @@
 </p:sld>
 </file>
 
+<file path=ppt/slides/slide10.xml><?xml version="1.0" encoding="utf-8"?>
+<p:sld xmlns:a="http://schemas.openxmlformats.org/drawingml/2006/main" xmlns:r="http://schemas.openxmlformats.org/officeDocument/2006/relationships" xmlns:p="http://schemas.openxmlformats.org/presentationml/2006/main">
+  <p:cSld>
+    <p:spTree>
+      <p:nvGrpSpPr>
+        <p:cNvPr id="1" name=""/>
+        <p:cNvGrpSpPr/>
+        <p:nvPr/>
+      </p:nvGrpSpPr>
+      <p:grpSpPr>
+        <a:xfrm>
+          <a:off x="0" y="0"/>
+          <a:ext cx="0" cy="0"/>
+          <a:chOff x="0" y="0"/>
+          <a:chExt cx="0" cy="0"/>
+        </a:xfrm>
+      </p:grpSpPr>
+      <p:sp>
+        <p:nvSpPr>
+          <p:cNvPr id="2" name="Title 1">
+            <a:extLst>
+              <a:ext uri="{FF2B5EF4-FFF2-40B4-BE49-F238E27FC236}">
+                <a16:creationId xmlns:a16="http://schemas.microsoft.com/office/drawing/2014/main" id="{2953270D-CBE2-B621-41BF-661AFC1A20B9}"/>
+              </a:ext>
+            </a:extLst>
+          </p:cNvPr>
+          <p:cNvSpPr>
+            <a:spLocks noGrp="1"/>
+          </p:cNvSpPr>
+          <p:nvPr>
+            <p:ph type="title"/>
+          </p:nvPr>
+        </p:nvSpPr>
+        <p:spPr/>
+        <p:txBody>
+          <a:bodyPr/>
+          <a:lstStyle/>
+          <a:p>
+            <a:r>
+              <a:rPr lang="en-US" dirty="0"/>
+              <a:t>Test vs Training - </a:t>
+            </a:r>
+            <a:r>
+              <a:rPr lang="en-US" dirty="0" err="1"/>
+              <a:t>XGBoost</a:t>
+            </a:r>
+            <a:endParaRPr lang="en-US" dirty="0"/>
+          </a:p>
+        </p:txBody>
+      </p:sp>
+      <p:pic>
+        <p:nvPicPr>
+          <p:cNvPr id="7" name="Content Placeholder 6">
+            <a:extLst>
+              <a:ext uri="{FF2B5EF4-FFF2-40B4-BE49-F238E27FC236}">
+                <a16:creationId xmlns:a16="http://schemas.microsoft.com/office/drawing/2014/main" id="{F56D44FA-9EFE-A515-AAF0-594198675E3A}"/>
+              </a:ext>
+            </a:extLst>
+          </p:cNvPr>
+          <p:cNvPicPr>
+            <a:picLocks noGrp="1" noChangeAspect="1"/>
+          </p:cNvPicPr>
+          <p:nvPr>
+            <p:ph idx="1"/>
+          </p:nvPr>
+        </p:nvPicPr>
+        <p:blipFill>
+          <a:blip r:embed="rId2"/>
+          <a:stretch>
+            <a:fillRect/>
+          </a:stretch>
+        </p:blipFill>
+        <p:spPr>
+          <a:xfrm>
+            <a:off x="2310069" y="1885285"/>
+            <a:ext cx="8133300" cy="4039265"/>
+          </a:xfrm>
+          <a:prstGeom prst="rect">
+            <a:avLst/>
+          </a:prstGeom>
+        </p:spPr>
+      </p:pic>
+    </p:spTree>
+    <p:extLst>
+      <p:ext uri="{BB962C8B-B14F-4D97-AF65-F5344CB8AC3E}">
+        <p14:creationId xmlns:p14="http://schemas.microsoft.com/office/powerpoint/2010/main" val="1343665269"/>
+      </p:ext>
+    </p:extLst>
+  </p:cSld>
+  <p:clrMapOvr>
+    <a:masterClrMapping/>
+  </p:clrMapOvr>
+</p:sld>
+</file>
+
+<file path=ppt/slides/slide11.xml><?xml version="1.0" encoding="utf-8"?>
+<p:sld xmlns:a="http://schemas.openxmlformats.org/drawingml/2006/main" xmlns:r="http://schemas.openxmlformats.org/officeDocument/2006/relationships" xmlns:p="http://schemas.openxmlformats.org/presentationml/2006/main">
+  <p:cSld>
+    <p:spTree>
+      <p:nvGrpSpPr>
+        <p:cNvPr id="1" name=""/>
+        <p:cNvGrpSpPr/>
+        <p:nvPr/>
+      </p:nvGrpSpPr>
+      <p:grpSpPr>
+        <a:xfrm>
+          <a:off x="0" y="0"/>
+          <a:ext cx="0" cy="0"/>
+          <a:chOff x="0" y="0"/>
+          <a:chExt cx="0" cy="0"/>
+        </a:xfrm>
+      </p:grpSpPr>
+      <p:sp>
+        <p:nvSpPr>
+          <p:cNvPr id="2" name="Title 1">
+            <a:extLst>
+              <a:ext uri="{FF2B5EF4-FFF2-40B4-BE49-F238E27FC236}">
+                <a16:creationId xmlns:a16="http://schemas.microsoft.com/office/drawing/2014/main" id="{F5FC7A91-BC26-7F8D-D431-D1915E85D039}"/>
+              </a:ext>
+            </a:extLst>
+          </p:cNvPr>
+          <p:cNvSpPr>
+            <a:spLocks noGrp="1"/>
+          </p:cNvSpPr>
+          <p:nvPr>
+            <p:ph type="title"/>
+          </p:nvPr>
+        </p:nvSpPr>
+        <p:spPr/>
+        <p:txBody>
+          <a:bodyPr/>
+          <a:lstStyle/>
+          <a:p>
+            <a:r>
+              <a:rPr lang="en-US" dirty="0"/>
+              <a:t>3 – Tuning &amp; Pipeline</a:t>
+            </a:r>
+          </a:p>
+        </p:txBody>
+      </p:sp>
+      <p:sp>
+        <p:nvSpPr>
+          <p:cNvPr id="3" name="Content Placeholder 2">
+            <a:extLst>
+              <a:ext uri="{FF2B5EF4-FFF2-40B4-BE49-F238E27FC236}">
+                <a16:creationId xmlns:a16="http://schemas.microsoft.com/office/drawing/2014/main" id="{22AA00FD-7BC4-3F0B-3718-38D9D5F64484}"/>
+              </a:ext>
+            </a:extLst>
+          </p:cNvPr>
+          <p:cNvSpPr>
+            <a:spLocks noGrp="1"/>
+          </p:cNvSpPr>
+          <p:nvPr>
+            <p:ph idx="1"/>
+          </p:nvPr>
+        </p:nvSpPr>
+        <p:spPr>
+          <a:xfrm>
+            <a:off x="2286000" y="2052116"/>
+            <a:ext cx="8284139" cy="3997828"/>
+          </a:xfrm>
+        </p:spPr>
+        <p:txBody>
+          <a:bodyPr/>
+          <a:lstStyle/>
+          <a:p>
+            <a:r>
+              <a:rPr lang="en-US" dirty="0" err="1"/>
+              <a:t>GridSearchCV</a:t>
+            </a:r>
+            <a:r>
+              <a:rPr lang="en-US" dirty="0"/>
+              <a:t> for </a:t>
+            </a:r>
+            <a:r>
+              <a:rPr lang="en-US" dirty="0" err="1"/>
+              <a:t>XGBoost</a:t>
+            </a:r>
+            <a:r>
+              <a:rPr lang="en-US" dirty="0"/>
+              <a:t> model</a:t>
+            </a:r>
+          </a:p>
+          <a:p>
+            <a:r>
+              <a:rPr lang="en-CA" sz="1600" b="0" i="0" dirty="0">
+                <a:effectLst/>
+              </a:rPr>
+              <a:t>Best hyperparameters (select):</a:t>
+            </a:r>
+          </a:p>
+          <a:p>
+            <a:pPr lvl="1"/>
+            <a:r>
+              <a:rPr lang="en-CA" sz="1400" b="0" i="0" dirty="0">
+                <a:effectLst/>
+              </a:rPr>
+              <a:t>alpha: 0.5 </a:t>
+            </a:r>
+          </a:p>
+          <a:p>
+            <a:pPr lvl="1"/>
+            <a:r>
+              <a:rPr lang="en-CA" sz="1400" b="0" i="0" dirty="0">
+                <a:effectLst/>
+              </a:rPr>
+              <a:t>lambda: 2</a:t>
+            </a:r>
+          </a:p>
+          <a:p>
+            <a:pPr lvl="1"/>
+            <a:r>
+              <a:rPr lang="en-CA" sz="1400" b="0" i="0" dirty="0" err="1">
+                <a:effectLst/>
+              </a:rPr>
+              <a:t>learning_rate</a:t>
+            </a:r>
+            <a:r>
+              <a:rPr lang="en-CA" sz="1400" b="0" i="0" dirty="0">
+                <a:effectLst/>
+              </a:rPr>
+              <a:t>: 0.1</a:t>
+            </a:r>
+          </a:p>
+          <a:p>
+            <a:pPr lvl="1"/>
+            <a:r>
+              <a:rPr lang="en-CA" sz="1400" b="0" i="0" dirty="0" err="1">
+                <a:effectLst/>
+              </a:rPr>
+              <a:t>max_depth</a:t>
+            </a:r>
+            <a:r>
+              <a:rPr lang="en-CA" sz="1400" b="0" i="0" dirty="0">
+                <a:effectLst/>
+              </a:rPr>
+              <a:t>: 5</a:t>
+            </a:r>
+          </a:p>
+          <a:p>
+            <a:pPr lvl="1"/>
+            <a:r>
+              <a:rPr lang="en-CA" sz="1400" b="0" i="0" dirty="0" err="1">
+                <a:effectLst/>
+              </a:rPr>
+              <a:t>n_estimators</a:t>
+            </a:r>
+            <a:r>
+              <a:rPr lang="en-CA" sz="1400" b="0" i="0" dirty="0">
+                <a:effectLst/>
+              </a:rPr>
+              <a:t>: 200</a:t>
+            </a:r>
+          </a:p>
+        </p:txBody>
+      </p:sp>
+    </p:spTree>
+    <p:extLst>
+      <p:ext uri="{BB962C8B-B14F-4D97-AF65-F5344CB8AC3E}">
+        <p14:creationId xmlns:p14="http://schemas.microsoft.com/office/powerpoint/2010/main" val="844624878"/>
+      </p:ext>
+    </p:extLst>
+  </p:cSld>
+  <p:clrMapOvr>
+    <a:masterClrMapping/>
+  </p:clrMapOvr>
+</p:sld>
+</file>
+
+<file path=ppt/slides/slide12.xml><?xml version="1.0" encoding="utf-8"?>
+<p:sld xmlns:a="http://schemas.openxmlformats.org/drawingml/2006/main" xmlns:r="http://schemas.openxmlformats.org/officeDocument/2006/relationships" xmlns:p="http://schemas.openxmlformats.org/presentationml/2006/main">
+  <p:cSld>
+    <p:spTree>
+      <p:nvGrpSpPr>
+        <p:cNvPr id="1" name=""/>
+        <p:cNvGrpSpPr/>
+        <p:nvPr/>
+      </p:nvGrpSpPr>
+      <p:grpSpPr>
+        <a:xfrm>
+          <a:off x="0" y="0"/>
+          <a:ext cx="0" cy="0"/>
+          <a:chOff x="0" y="0"/>
+          <a:chExt cx="0" cy="0"/>
+        </a:xfrm>
+      </p:grpSpPr>
+      <p:sp>
+        <p:nvSpPr>
+          <p:cNvPr id="2" name="Title 1">
+            <a:extLst>
+              <a:ext uri="{FF2B5EF4-FFF2-40B4-BE49-F238E27FC236}">
+                <a16:creationId xmlns:a16="http://schemas.microsoft.com/office/drawing/2014/main" id="{B7C843B0-DF4F-C2D2-2911-D3BDE5B992C6}"/>
+              </a:ext>
+            </a:extLst>
+          </p:cNvPr>
+          <p:cNvSpPr>
+            <a:spLocks noGrp="1"/>
+          </p:cNvSpPr>
+          <p:nvPr>
+            <p:ph type="title"/>
+          </p:nvPr>
+        </p:nvSpPr>
+        <p:spPr/>
+        <p:txBody>
+          <a:bodyPr/>
+          <a:lstStyle/>
+          <a:p>
+            <a:r>
+              <a:rPr lang="en-US" dirty="0"/>
+              <a:t>Challenges &amp; Next Steps</a:t>
+            </a:r>
+          </a:p>
+        </p:txBody>
+      </p:sp>
+      <p:sp>
+        <p:nvSpPr>
+          <p:cNvPr id="3" name="Content Placeholder 2">
+            <a:extLst>
+              <a:ext uri="{FF2B5EF4-FFF2-40B4-BE49-F238E27FC236}">
+                <a16:creationId xmlns:a16="http://schemas.microsoft.com/office/drawing/2014/main" id="{7FD3766B-8ABA-F6F4-84F7-C007DA838498}"/>
+              </a:ext>
+            </a:extLst>
+          </p:cNvPr>
+          <p:cNvSpPr>
+            <a:spLocks noGrp="1"/>
+          </p:cNvSpPr>
+          <p:nvPr>
+            <p:ph idx="1"/>
+          </p:nvPr>
+        </p:nvSpPr>
+        <p:spPr/>
+        <p:txBody>
+          <a:bodyPr>
+            <a:normAutofit lnSpcReduction="10000"/>
+          </a:bodyPr>
+          <a:lstStyle/>
+          <a:p>
+            <a:r>
+              <a:rPr lang="en-US" dirty="0" err="1"/>
+              <a:t>XGBoost</a:t>
+            </a:r>
+            <a:r>
+              <a:rPr lang="en-US" dirty="0"/>
+              <a:t> is our best model so far but it still has very high RMSE</a:t>
+            </a:r>
+          </a:p>
+          <a:p>
+            <a:r>
+              <a:rPr lang="en-US" dirty="0"/>
+              <a:t>Very likely that State &amp; City is impacting </a:t>
+            </a:r>
+            <a:r>
+              <a:rPr lang="en-US" dirty="0" err="1"/>
+              <a:t>sold_price</a:t>
+            </a:r>
+            <a:r>
+              <a:rPr lang="en-US" dirty="0"/>
+              <a:t> but this was removed from our model to reduce complexity</a:t>
+            </a:r>
+          </a:p>
+          <a:p>
+            <a:pPr lvl="1"/>
+            <a:r>
+              <a:rPr lang="en-US" dirty="0"/>
+              <a:t>How do we use </a:t>
+            </a:r>
+            <a:r>
+              <a:rPr lang="en-US" dirty="0" err="1"/>
+              <a:t>OHE’d</a:t>
+            </a:r>
+            <a:r>
+              <a:rPr lang="en-US" dirty="0"/>
+              <a:t> states and cities which would make the # of combinations of features enormous?</a:t>
+            </a:r>
+          </a:p>
+          <a:p>
+            <a:r>
+              <a:rPr lang="en-US" dirty="0"/>
+              <a:t>PCA could be used to reduce down number of features</a:t>
+            </a:r>
+          </a:p>
+          <a:p>
+            <a:r>
+              <a:rPr lang="en-US" dirty="0"/>
+              <a:t>Build a pipeline with data cleaning, feature engineering &amp; scaling in custom functions and then fit model</a:t>
+            </a:r>
+          </a:p>
+          <a:p>
+            <a:pPr lvl="1"/>
+            <a:r>
+              <a:rPr lang="en-US" dirty="0"/>
+              <a:t>Custom function e.g. if </a:t>
+            </a:r>
+            <a:r>
+              <a:rPr lang="en-US" dirty="0" err="1"/>
+              <a:t>col.isnull</a:t>
+            </a:r>
+            <a:r>
+              <a:rPr lang="en-US" dirty="0"/>
+              <a:t> % &gt; 95 then drop…</a:t>
+            </a:r>
+          </a:p>
+        </p:txBody>
+      </p:sp>
+    </p:spTree>
+    <p:extLst>
+      <p:ext uri="{BB962C8B-B14F-4D97-AF65-F5344CB8AC3E}">
+        <p14:creationId xmlns:p14="http://schemas.microsoft.com/office/powerpoint/2010/main" val="946378330"/>
+      </p:ext>
+    </p:extLst>
+  </p:cSld>
+  <p:clrMapOvr>
+    <a:masterClrMapping/>
+  </p:clrMapOvr>
+</p:sld>
+</file>
+
 <file path=ppt/slides/slide2.xml><?xml version="1.0" encoding="utf-8"?>
 <p:sld xmlns:a="http://schemas.openxmlformats.org/drawingml/2006/main" xmlns:r="http://schemas.openxmlformats.org/officeDocument/2006/relationships" xmlns:p="http://schemas.openxmlformats.org/presentationml/2006/main">
   <p:cSld>
@@ -4648,26 +5068,36 @@
           <a:lstStyle/>
           <a:p>
             <a:r>
+              <a:rPr lang="en-US" b="1" dirty="0"/>
+              <a:t>Build a ML Model to predict Real Estate housing prices:</a:t>
+            </a:r>
+          </a:p>
+          <a:p>
+            <a:pPr lvl="1"/>
+            <a:r>
               <a:rPr lang="en-US" dirty="0"/>
               <a:t>Join together a large number of JSON files with real estate data from many different states</a:t>
             </a:r>
           </a:p>
           <a:p>
+            <a:pPr lvl="1"/>
             <a:r>
               <a:rPr lang="en-US" dirty="0"/>
               <a:t>Clean the data and look for relationships with the sold price of the home</a:t>
             </a:r>
           </a:p>
           <a:p>
+            <a:pPr lvl="1"/>
             <a:r>
               <a:rPr lang="en-US" dirty="0"/>
               <a:t>Build a Linear ML model to predict housing prices.</a:t>
             </a:r>
           </a:p>
           <a:p>
-            <a:r>
-              <a:rPr lang="en-US" dirty="0"/>
-              <a:t>Tune hyperparameters and build a pipeline </a:t>
+            <a:pPr lvl="1"/>
+            <a:r>
+              <a:rPr lang="en-US" dirty="0"/>
+              <a:t>Tune hyperparameters and build a pipeline to accept new data</a:t>
             </a:r>
           </a:p>
         </p:txBody>
@@ -5618,15 +6048,7 @@
           <a:p>
             <a:r>
               <a:rPr lang="en-US" dirty="0"/>
-              <a:t>Red </a:t>
-            </a:r>
-            <a:r>
-              <a:rPr lang="en-US" dirty="0" err="1"/>
-              <a:t>boxes,Descending</a:t>
-            </a:r>
-            <a:r>
-              <a:rPr lang="en-US" dirty="0"/>
-              <a:t>:</a:t>
+              <a:t>Red boxes, Descending:</a:t>
             </a:r>
           </a:p>
           <a:p>
@@ -5812,8 +6234,15 @@
             </a:r>
             <a:r>
               <a:rPr lang="en-US" dirty="0"/>
-              <a:t> Test = 0.509</a:t>
-            </a:r>
+              <a:t> Test = 0.509, </a:t>
+            </a:r>
+            <a:r>
+              <a:rPr lang="en-CA" b="0" i="0" dirty="0">
+                <a:effectLst/>
+              </a:rPr>
+              <a:t>Test RMSE: $227,331.0</a:t>
+            </a:r>
+            <a:endParaRPr lang="en-US" dirty="0"/>
           </a:p>
           <a:p>
             <a:pPr lvl="1"/>
@@ -5901,40 +6330,55 @@
             <p:ph type="title"/>
           </p:nvPr>
         </p:nvSpPr>
-        <p:spPr/>
+        <p:spPr>
+          <a:xfrm>
+            <a:off x="2028554" y="808056"/>
+            <a:ext cx="8541585" cy="1077229"/>
+          </a:xfrm>
+        </p:spPr>
         <p:txBody>
           <a:bodyPr/>
           <a:lstStyle/>
           <a:p>
-            <a:endParaRPr lang="en-US"/>
-          </a:p>
-        </p:txBody>
-      </p:sp>
-      <p:sp>
-        <p:nvSpPr>
-          <p:cNvPr id="3" name="Content Placeholder 2">
+            <a:r>
+              <a:rPr lang="en-US" dirty="0"/>
+              <a:t>Test vs Training – what does the relationship look like?</a:t>
+            </a:r>
+          </a:p>
+        </p:txBody>
+      </p:sp>
+      <p:pic>
+        <p:nvPicPr>
+          <p:cNvPr id="7" name="Content Placeholder 6">
             <a:extLst>
               <a:ext uri="{FF2B5EF4-FFF2-40B4-BE49-F238E27FC236}">
-                <a16:creationId xmlns:a16="http://schemas.microsoft.com/office/drawing/2014/main" id="{A6680B6F-7C05-5792-85E5-DD04C439404C}"/>
+                <a16:creationId xmlns:a16="http://schemas.microsoft.com/office/drawing/2014/main" id="{A05FB02E-BE48-A6C9-D8D2-300C730EC1D5}"/>
               </a:ext>
             </a:extLst>
           </p:cNvPr>
-          <p:cNvSpPr>
-            <a:spLocks noGrp="1"/>
-          </p:cNvSpPr>
+          <p:cNvPicPr>
+            <a:picLocks noGrp="1" noChangeAspect="1"/>
+          </p:cNvPicPr>
           <p:nvPr>
             <p:ph idx="1"/>
           </p:nvPr>
-        </p:nvSpPr>
-        <p:spPr/>
-        <p:txBody>
-          <a:bodyPr/>
-          <a:lstStyle/>
-          <a:p>
-            <a:endParaRPr lang="en-US"/>
-          </a:p>
-        </p:txBody>
-      </p:sp>
+        </p:nvPicPr>
+        <p:blipFill>
+          <a:blip r:embed="rId2"/>
+          <a:stretch>
+            <a:fillRect/>
+          </a:stretch>
+        </p:blipFill>
+        <p:spPr>
+          <a:xfrm>
+            <a:off x="2196889" y="1885285"/>
+            <a:ext cx="7798222" cy="3867539"/>
+          </a:xfrm>
+          <a:prstGeom prst="rect">
+            <a:avLst/>
+          </a:prstGeom>
+        </p:spPr>
+      </p:pic>
     </p:spTree>
     <p:extLst>
       <p:ext uri="{BB962C8B-B14F-4D97-AF65-F5344CB8AC3E}">
@@ -5986,7 +6430,10 @@
           <a:bodyPr/>
           <a:lstStyle/>
           <a:p>
-            <a:endParaRPr lang="en-US"/>
+            <a:r>
+              <a:rPr lang="en-US" dirty="0"/>
+              <a:t>2 – Model Selection</a:t>
+            </a:r>
           </a:p>
         </p:txBody>
       </p:sp>
@@ -6011,7 +6458,71 @@
           <a:bodyPr/>
           <a:lstStyle/>
           <a:p>
-            <a:endParaRPr lang="en-US"/>
+            <a:r>
+              <a:rPr lang="en-US" dirty="0" err="1"/>
+              <a:t>XGBoost</a:t>
+            </a:r>
+            <a:r>
+              <a:rPr lang="en-US" dirty="0"/>
+              <a:t> – R</a:t>
+            </a:r>
+            <a:r>
+              <a:rPr lang="en-US" baseline="30000" dirty="0"/>
+              <a:t>2</a:t>
+            </a:r>
+            <a:r>
+              <a:rPr lang="en-US" dirty="0"/>
+              <a:t> Train 0.76; R</a:t>
+            </a:r>
+            <a:r>
+              <a:rPr lang="en-US" baseline="30000" dirty="0"/>
+              <a:t>2</a:t>
+            </a:r>
+            <a:r>
+              <a:rPr lang="en-US" dirty="0"/>
+              <a:t> Test 0.56</a:t>
+            </a:r>
+          </a:p>
+          <a:p>
+            <a:r>
+              <a:rPr lang="en-US" dirty="0"/>
+              <a:t>Suggests a lot of overfitting, but </a:t>
+            </a:r>
+            <a:r>
+              <a:rPr lang="en-US" dirty="0" err="1"/>
+              <a:t>XGBoost</a:t>
+            </a:r>
+            <a:r>
+              <a:rPr lang="en-US" dirty="0"/>
+              <a:t> is our strongest performing model so this was taken forward to tune hyperparameters</a:t>
+            </a:r>
+          </a:p>
+          <a:p>
+            <a:r>
+              <a:rPr lang="en-CA" b="0" i="0" dirty="0">
+                <a:effectLst/>
+              </a:rPr>
+              <a:t>Test RMSE (</a:t>
+            </a:r>
+            <a:r>
+              <a:rPr lang="en-CA" b="0" i="0" dirty="0" err="1">
+                <a:effectLst/>
+              </a:rPr>
+              <a:t>XGBoost</a:t>
+            </a:r>
+            <a:r>
+              <a:rPr lang="en-CA" b="0" i="0" dirty="0">
+                <a:effectLst/>
+              </a:rPr>
+              <a:t>): $ 215,347.0</a:t>
+            </a:r>
+          </a:p>
+          <a:p>
+            <a:r>
+              <a:rPr lang="en-CA" dirty="0"/>
+              <a:t>This is still not an effective model</a:t>
+            </a:r>
+            <a:endParaRPr lang="en-US" dirty="0"/>
           </a:p>
         </p:txBody>
       </p:sp>

</xml_diff>